<commit_message>
Updates to readme and updates to decks
</commit_message>
<xml_diff>
--- a/Presentation/16-HOL-Teams.pptx
+++ b/Presentation/16-HOL-Teams.pptx
@@ -6,15 +6,18 @@
     <p:sldMasterId id="2147484229" r:id="rId5"/>
   </p:sldMasterIdLst>
   <p:notesMasterIdLst>
-    <p:notesMasterId r:id="rId9"/>
+    <p:notesMasterId r:id="rId12"/>
   </p:notesMasterIdLst>
   <p:handoutMasterIdLst>
-    <p:handoutMasterId r:id="rId10"/>
+    <p:handoutMasterId r:id="rId13"/>
   </p:handoutMasterIdLst>
   <p:sldIdLst>
     <p:sldId id="256" r:id="rId6"/>
-    <p:sldId id="257" r:id="rId7"/>
-    <p:sldId id="258" r:id="rId8"/>
+    <p:sldId id="259" r:id="rId7"/>
+    <p:sldId id="260" r:id="rId8"/>
+    <p:sldId id="261" r:id="rId9"/>
+    <p:sldId id="257" r:id="rId10"/>
+    <p:sldId id="258" r:id="rId11"/>
   </p:sldIdLst>
   <p:sldSz cx="12436475" cy="6994525"/>
   <p:notesSz cx="6858000" cy="9144000"/>
@@ -122,7 +125,11 @@
           </p14:sldIdLst>
         </p14:section>
         <p14:section name="White Template" id="{5B0B8DFF-57E5-4D4B-BA72-542DF84B8E2F}">
-          <p14:sldIdLst/>
+          <p14:sldIdLst>
+            <p14:sldId id="259"/>
+            <p14:sldId id="260"/>
+            <p14:sldId id="261"/>
+          </p14:sldIdLst>
         </p14:section>
         <p14:section name="Color Template" id="{A073DAE3-B461-442F-A3D3-6642BD875E45}">
           <p14:sldIdLst>
@@ -267,7 +274,7 @@
               <a:rPr lang="en-US" smtClean="0">
                 <a:latin typeface="Segoe UI" pitchFamily="34" charset="0"/>
               </a:rPr>
-              <a:t>6/1/2017 12:24 AM</a:t>
+              <a:t>6/1/2017 6:48 PM</a:t>
             </a:fld>
             <a:endParaRPr lang="en-US" dirty="0">
               <a:latin typeface="Segoe UI" pitchFamily="34" charset="0"/>
@@ -545,7 +552,7 @@
           <a:p>
             <a:fld id="{5A9E72A3-73C3-4EC0-976B-555052BC0BC2}" type="datetime8">
               <a:rPr lang="en-US" smtClean="0"/>
-              <a:t>6/1/2017 12:24 AM</a:t>
+              <a:t>6/1/2017 6:48 PM</a:t>
             </a:fld>
             <a:endParaRPr lang="en-US" dirty="0"/>
           </a:p>
@@ -951,7 +958,7 @@
                 <a:tabLst/>
                 <a:defRPr/>
               </a:pPr>
-              <a:t>6/1/2017 12:24 AM</a:t>
+              <a:t>6/1/2017 6:48 PM</a:t>
             </a:fld>
             <a:endParaRPr kumimoji="0" lang="en-US" sz="1200" b="0" i="0" u="none" strike="noStrike" kern="1200" cap="none" spc="0" normalizeH="0" baseline="0" noProof="0" dirty="0">
               <a:ln>
@@ -1309,7 +1316,7 @@
                 <a:tabLst/>
                 <a:defRPr/>
               </a:pPr>
-              <a:t>6/1/2017 12:24 AM</a:t>
+              <a:t>6/1/2017 6:48 PM</a:t>
             </a:fld>
             <a:endParaRPr kumimoji="0" lang="en-US" sz="1200" b="0" i="0" u="none" strike="noStrike" kern="1200" cap="none" spc="0" normalizeH="0" baseline="0" noProof="0" dirty="0">
               <a:ln>
@@ -1392,7 +1399,7 @@
                 <a:tabLst/>
                 <a:defRPr/>
               </a:pPr>
-              <a:t>2</a:t>
+              <a:t>5</a:t>
             </a:fld>
             <a:endParaRPr kumimoji="0" lang="en-US" sz="1200" b="0" i="0" u="none" strike="noStrike" kern="1200" cap="none" spc="0" normalizeH="0" baseline="0" noProof="0" dirty="0">
               <a:ln>
@@ -1682,7 +1689,7 @@
                 <a:tabLst/>
                 <a:defRPr/>
               </a:pPr>
-              <a:t>6/1/2017 12:24 AM</a:t>
+              <a:t>6/1/2017 6:48 PM</a:t>
             </a:fld>
             <a:endParaRPr kumimoji="0" lang="en-US" sz="1200" b="0" i="0" u="none" strike="noStrike" kern="1200" cap="none" spc="0" normalizeH="0" baseline="0" noProof="0" dirty="0">
               <a:ln>
@@ -1765,7 +1772,7 @@
                 <a:tabLst/>
                 <a:defRPr/>
               </a:pPr>
-              <a:t>3</a:t>
+              <a:t>6</a:t>
             </a:fld>
             <a:endParaRPr kumimoji="0" lang="en-US" sz="1200" b="0" i="0" u="none" strike="noStrike" kern="1200" cap="none" spc="0" normalizeH="0" baseline="0" noProof="0" dirty="0">
               <a:ln>
@@ -14695,6 +14702,269 @@
       </p:grpSpPr>
       <p:sp>
         <p:nvSpPr>
+          <p:cNvPr id="4" name="Title 3"/>
+          <p:cNvSpPr>
+            <a:spLocks noGrp="1"/>
+          </p:cNvSpPr>
+          <p:nvPr>
+            <p:ph type="title"/>
+          </p:nvPr>
+        </p:nvSpPr>
+        <p:spPr/>
+        <p:txBody>
+          <a:bodyPr/>
+          <a:lstStyle/>
+          <a:p>
+            <a:r>
+              <a:rPr lang="en-US" dirty="0"/>
+              <a:t>Agenda</a:t>
+            </a:r>
+          </a:p>
+        </p:txBody>
+      </p:sp>
+      <p:sp>
+        <p:nvSpPr>
+          <p:cNvPr id="5" name="Text Placeholder 4"/>
+          <p:cNvSpPr>
+            <a:spLocks noGrp="1"/>
+          </p:cNvSpPr>
+          <p:nvPr>
+            <p:ph type="body" sz="quarter" idx="10"/>
+          </p:nvPr>
+        </p:nvSpPr>
+        <p:spPr>
+          <a:xfrm>
+            <a:off x="274638" y="1212850"/>
+            <a:ext cx="11887200" cy="2769989"/>
+          </a:xfrm>
+        </p:spPr>
+        <p:txBody>
+          <a:bodyPr/>
+          <a:lstStyle/>
+          <a:p>
+            <a:r>
+              <a:rPr lang="en-US" dirty="0"/>
+              <a:t>Code samples</a:t>
+            </a:r>
+          </a:p>
+          <a:p>
+            <a:r>
+              <a:rPr lang="en-US" dirty="0"/>
+              <a:t>Bot sample</a:t>
+            </a:r>
+          </a:p>
+          <a:p>
+            <a:r>
+              <a:rPr lang="en-US" dirty="0"/>
+              <a:t>Connector</a:t>
+            </a:r>
+          </a:p>
+          <a:p>
+            <a:endParaRPr lang="en-US" dirty="0"/>
+          </a:p>
+        </p:txBody>
+      </p:sp>
+    </p:spTree>
+    <p:extLst>
+      <p:ext uri="{BB962C8B-B14F-4D97-AF65-F5344CB8AC3E}">
+        <p14:creationId xmlns:p14="http://schemas.microsoft.com/office/powerpoint/2010/main" val="2858742429"/>
+      </p:ext>
+    </p:extLst>
+  </p:cSld>
+  <p:clrMapOvr>
+    <a:masterClrMapping/>
+  </p:clrMapOvr>
+  <p:transition>
+    <p:fade/>
+  </p:transition>
+</p:sld>
+</file>
+
+<file path=ppt/slides/slide3.xml><?xml version="1.0" encoding="utf-8"?>
+<p:sld xmlns:a="http://schemas.openxmlformats.org/drawingml/2006/main" xmlns:r="http://schemas.openxmlformats.org/officeDocument/2006/relationships" xmlns:p="http://schemas.openxmlformats.org/presentationml/2006/main">
+  <p:cSld>
+    <p:spTree>
+      <p:nvGrpSpPr>
+        <p:cNvPr id="1" name=""/>
+        <p:cNvGrpSpPr/>
+        <p:nvPr/>
+      </p:nvGrpSpPr>
+      <p:grpSpPr>
+        <a:xfrm>
+          <a:off x="0" y="0"/>
+          <a:ext cx="0" cy="0"/>
+          <a:chOff x="0" y="0"/>
+          <a:chExt cx="0" cy="0"/>
+        </a:xfrm>
+      </p:grpSpPr>
+      <p:sp>
+        <p:nvSpPr>
+          <p:cNvPr id="2" name="Title 1"/>
+          <p:cNvSpPr>
+            <a:spLocks noGrp="1"/>
+          </p:cNvSpPr>
+          <p:nvPr>
+            <p:ph type="title"/>
+          </p:nvPr>
+        </p:nvSpPr>
+        <p:spPr/>
+        <p:txBody>
+          <a:bodyPr/>
+          <a:lstStyle/>
+          <a:p>
+            <a:r>
+              <a:rPr lang="en-US" dirty="0"/>
+              <a:t>Links</a:t>
+            </a:r>
+          </a:p>
+        </p:txBody>
+      </p:sp>
+      <p:sp>
+        <p:nvSpPr>
+          <p:cNvPr id="3" name="Text Placeholder 2"/>
+          <p:cNvSpPr>
+            <a:spLocks noGrp="1"/>
+          </p:cNvSpPr>
+          <p:nvPr>
+            <p:ph type="body" sz="quarter" idx="10"/>
+          </p:nvPr>
+        </p:nvSpPr>
+        <p:spPr>
+          <a:xfrm>
+            <a:off x="274638" y="1212850"/>
+            <a:ext cx="11887200" cy="1969770"/>
+          </a:xfrm>
+        </p:spPr>
+        <p:txBody>
+          <a:bodyPr/>
+          <a:lstStyle/>
+          <a:p>
+            <a:r>
+              <a:rPr lang="en-US" dirty="0">
+                <a:hlinkClick r:id="rId2"/>
+              </a:rPr>
+              <a:t>https://msdn.microsoft.com/en-us/microsoft-teams/teamsapps</a:t>
+            </a:r>
+            <a:endParaRPr lang="en-US" dirty="0"/>
+          </a:p>
+          <a:p>
+            <a:endParaRPr lang="en-US" dirty="0"/>
+          </a:p>
+        </p:txBody>
+      </p:sp>
+    </p:spTree>
+    <p:extLst>
+      <p:ext uri="{BB962C8B-B14F-4D97-AF65-F5344CB8AC3E}">
+        <p14:creationId xmlns:p14="http://schemas.microsoft.com/office/powerpoint/2010/main" val="2139495807"/>
+      </p:ext>
+    </p:extLst>
+  </p:cSld>
+  <p:clrMapOvr>
+    <a:masterClrMapping/>
+  </p:clrMapOvr>
+  <p:transition>
+    <p:fade/>
+  </p:transition>
+</p:sld>
+</file>
+
+<file path=ppt/slides/slide4.xml><?xml version="1.0" encoding="utf-8"?>
+<p:sld xmlns:a="http://schemas.openxmlformats.org/drawingml/2006/main" xmlns:r="http://schemas.openxmlformats.org/officeDocument/2006/relationships" xmlns:p="http://schemas.openxmlformats.org/presentationml/2006/main">
+  <p:cSld>
+    <p:spTree>
+      <p:nvGrpSpPr>
+        <p:cNvPr id="1" name=""/>
+        <p:cNvGrpSpPr/>
+        <p:nvPr/>
+      </p:nvGrpSpPr>
+      <p:grpSpPr>
+        <a:xfrm>
+          <a:off x="0" y="0"/>
+          <a:ext cx="0" cy="0"/>
+          <a:chOff x="0" y="0"/>
+          <a:chExt cx="0" cy="0"/>
+        </a:xfrm>
+      </p:grpSpPr>
+      <p:sp>
+        <p:nvSpPr>
+          <p:cNvPr id="2" name="Title 1"/>
+          <p:cNvSpPr>
+            <a:spLocks noGrp="1"/>
+          </p:cNvSpPr>
+          <p:nvPr>
+            <p:ph type="title"/>
+          </p:nvPr>
+        </p:nvSpPr>
+        <p:spPr/>
+        <p:txBody>
+          <a:bodyPr/>
+          <a:lstStyle/>
+          <a:p>
+            <a:r>
+              <a:rPr lang="en-US" dirty="0" err="1"/>
+              <a:t>Sideloading</a:t>
+            </a:r>
+            <a:r>
+              <a:rPr lang="en-US" dirty="0"/>
+              <a:t> your app in a team</a:t>
+            </a:r>
+          </a:p>
+        </p:txBody>
+      </p:sp>
+      <p:sp>
+        <p:nvSpPr>
+          <p:cNvPr id="3" name="Text Placeholder 2"/>
+          <p:cNvSpPr>
+            <a:spLocks noGrp="1"/>
+          </p:cNvSpPr>
+          <p:nvPr>
+            <p:ph type="body" sz="quarter" idx="10"/>
+          </p:nvPr>
+        </p:nvSpPr>
+        <p:spPr/>
+        <p:txBody>
+          <a:bodyPr/>
+          <a:lstStyle/>
+          <a:p>
+            <a:endParaRPr lang="en-US" dirty="0"/>
+          </a:p>
+        </p:txBody>
+      </p:sp>
+    </p:spTree>
+    <p:extLst>
+      <p:ext uri="{BB962C8B-B14F-4D97-AF65-F5344CB8AC3E}">
+        <p14:creationId xmlns:p14="http://schemas.microsoft.com/office/powerpoint/2010/main" val="2823141250"/>
+      </p:ext>
+    </p:extLst>
+  </p:cSld>
+  <p:clrMapOvr>
+    <a:masterClrMapping/>
+  </p:clrMapOvr>
+  <p:transition>
+    <p:fade/>
+  </p:transition>
+</p:sld>
+</file>
+
+<file path=ppt/slides/slide5.xml><?xml version="1.0" encoding="utf-8"?>
+<p:sld xmlns:a="http://schemas.openxmlformats.org/drawingml/2006/main" xmlns:r="http://schemas.openxmlformats.org/officeDocument/2006/relationships" xmlns:p="http://schemas.openxmlformats.org/presentationml/2006/main">
+  <p:cSld>
+    <p:spTree>
+      <p:nvGrpSpPr>
+        <p:cNvPr id="1" name=""/>
+        <p:cNvGrpSpPr/>
+        <p:nvPr/>
+      </p:nvGrpSpPr>
+      <p:grpSpPr>
+        <a:xfrm>
+          <a:off x="0" y="0"/>
+          <a:ext cx="0" cy="0"/>
+          <a:chOff x="0" y="0"/>
+          <a:chExt cx="0" cy="0"/>
+        </a:xfrm>
+      </p:grpSpPr>
+      <p:sp>
+        <p:nvSpPr>
           <p:cNvPr id="2" name="Title 1"/>
           <p:cNvSpPr>
             <a:spLocks noGrp="1"/>
@@ -14755,7 +15025,7 @@
 </p:sld>
 </file>
 
-<file path=ppt/slides/slide3.xml><?xml version="1.0" encoding="utf-8"?>
+<file path=ppt/slides/slide6.xml><?xml version="1.0" encoding="utf-8"?>
 <p:sld xmlns:a="http://schemas.openxmlformats.org/drawingml/2006/main" xmlns:r="http://schemas.openxmlformats.org/officeDocument/2006/relationships" xmlns:p="http://schemas.openxmlformats.org/presentationml/2006/main">
   <p:cSld>
     <p:spTree>
@@ -15968,21 +16238,6 @@
 </file>
 
 <file path=customXml/item1.xml><?xml version="1.0" encoding="utf-8"?>
-<p:properties xmlns:p="http://schemas.microsoft.com/office/2006/metadata/properties" xmlns:xsi="http://www.w3.org/2001/XMLSchema-instance" xmlns:pc="http://schemas.microsoft.com/office/infopath/2007/PartnerControls">
-  <documentManagement/>
-</p:properties>
-</file>
-
-<file path=customXml/item2.xml><?xml version="1.0" encoding="utf-8"?>
-<?mso-contentType ?>
-<FormTemplates xmlns="http://schemas.microsoft.com/sharepoint/v3/contenttype/forms">
-  <Display>DocumentLibraryForm</Display>
-  <Edit>DocumentLibraryForm</Edit>
-  <New>DocumentLibraryForm</New>
-</FormTemplates>
-</file>
-
-<file path=customXml/item3.xml><?xml version="1.0" encoding="utf-8"?>
 <ct:contentTypeSchema xmlns:ct="http://schemas.microsoft.com/office/2006/metadata/contentType" xmlns:ma="http://schemas.microsoft.com/office/2006/metadata/properties/metaAttributes" ct:_="" ma:_="" ma:contentTypeName="Document" ma:contentTypeID="0x010100A2B0BB5962AB3C45A9A1CE1EC4C4F647" ma:contentTypeVersion="3" ma:contentTypeDescription="Create a new document." ma:contentTypeScope="" ma:versionID="f0876370c90de824ab54c09b0bd2a056">
   <xsd:schema xmlns:xsd="http://www.w3.org/2001/XMLSchema" xmlns:xs="http://www.w3.org/2001/XMLSchema" xmlns:p="http://schemas.microsoft.com/office/2006/metadata/properties" xmlns:ns3="630a2e83-186a-4a0f-ab27-bee8a8096abc" targetNamespace="http://schemas.microsoft.com/office/2006/metadata/properties" ma:root="true" ma:fieldsID="a2a3b5ed8b4accd7c8a398d0cb075271" ns3:_="">
     <xsd:import namespace="630a2e83-186a-4a0f-ab27-bee8a8096abc"/>
@@ -16136,31 +16391,22 @@
 </ct:contentTypeSchema>
 </file>
 
-<file path=customXml/itemProps1.xml><?xml version="1.0" encoding="utf-8"?>
-<ds:datastoreItem xmlns:ds="http://schemas.openxmlformats.org/officeDocument/2006/customXml" ds:itemID="{F990F116-B58F-4255-B05B-DA3808E0E5C6}">
-  <ds:schemaRefs>
-    <ds:schemaRef ds:uri="http://schemas.microsoft.com/office/2006/metadata/properties"/>
-    <ds:schemaRef ds:uri="http://purl.org/dc/terms/"/>
-    <ds:schemaRef ds:uri="http://schemas.openxmlformats.org/package/2006/metadata/core-properties"/>
-    <ds:schemaRef ds:uri="630a2e83-186a-4a0f-ab27-bee8a8096abc"/>
-    <ds:schemaRef ds:uri="http://schemas.microsoft.com/office/2006/documentManagement/types"/>
-    <ds:schemaRef ds:uri="http://schemas.microsoft.com/office/infopath/2007/PartnerControls"/>
-    <ds:schemaRef ds:uri="http://purl.org/dc/elements/1.1/"/>
-    <ds:schemaRef ds:uri="http://www.w3.org/XML/1998/namespace"/>
-    <ds:schemaRef ds:uri="http://purl.org/dc/dcmitype/"/>
-  </ds:schemaRefs>
-</ds:datastoreItem>
+<file path=customXml/item2.xml><?xml version="1.0" encoding="utf-8"?>
+<?mso-contentType ?>
+<FormTemplates xmlns="http://schemas.microsoft.com/sharepoint/v3/contenttype/forms">
+  <Display>DocumentLibraryForm</Display>
+  <Edit>DocumentLibraryForm</Edit>
+  <New>DocumentLibraryForm</New>
+</FormTemplates>
 </file>
 
-<file path=customXml/itemProps2.xml><?xml version="1.0" encoding="utf-8"?>
-<ds:datastoreItem xmlns:ds="http://schemas.openxmlformats.org/officeDocument/2006/customXml" ds:itemID="{758FDAC0-319D-4A54-8D8E-1D42CB1F8004}">
-  <ds:schemaRefs>
-    <ds:schemaRef ds:uri="http://schemas.microsoft.com/sharepoint/v3/contenttype/forms"/>
-  </ds:schemaRefs>
-</ds:datastoreItem>
+<file path=customXml/item3.xml><?xml version="1.0" encoding="utf-8"?>
+<p:properties xmlns:p="http://schemas.microsoft.com/office/2006/metadata/properties" xmlns:xsi="http://www.w3.org/2001/XMLSchema-instance" xmlns:pc="http://schemas.microsoft.com/office/infopath/2007/PartnerControls">
+  <documentManagement/>
+</p:properties>
 </file>
 
-<file path=customXml/itemProps3.xml><?xml version="1.0" encoding="utf-8"?>
+<file path=customXml/itemProps1.xml><?xml version="1.0" encoding="utf-8"?>
 <ds:datastoreItem xmlns:ds="http://schemas.openxmlformats.org/officeDocument/2006/customXml" ds:itemID="{F4553072-E538-48C4-90FC-3653F32D67C5}">
   <ds:schemaRefs>
     <ds:schemaRef ds:uri="http://schemas.microsoft.com/office/2006/metadata/contentType"/>
@@ -16176,4 +16422,28 @@
     <ds:schemaRef ds:uri="http://schemas.microsoft.com/internal/obd"/>
   </ds:schemaRefs>
 </ds:datastoreItem>
+</file>
+
+<file path=customXml/itemProps2.xml><?xml version="1.0" encoding="utf-8"?>
+<ds:datastoreItem xmlns:ds="http://schemas.openxmlformats.org/officeDocument/2006/customXml" ds:itemID="{758FDAC0-319D-4A54-8D8E-1D42CB1F8004}">
+  <ds:schemaRefs>
+    <ds:schemaRef ds:uri="http://schemas.microsoft.com/sharepoint/v3/contenttype/forms"/>
+  </ds:schemaRefs>
+</ds:datastoreItem>
+</file>
+
+<file path=customXml/itemProps3.xml><?xml version="1.0" encoding="utf-8"?>
+<ds:datastoreItem xmlns:ds="http://schemas.openxmlformats.org/officeDocument/2006/customXml" ds:itemID="{F990F116-B58F-4255-B05B-DA3808E0E5C6}">
+  <ds:schemaRefs>
+    <ds:schemaRef ds:uri="http://schemas.microsoft.com/office/2006/metadata/properties"/>
+    <ds:schemaRef ds:uri="http://purl.org/dc/terms/"/>
+    <ds:schemaRef ds:uri="http://schemas.openxmlformats.org/package/2006/metadata/core-properties"/>
+    <ds:schemaRef ds:uri="630a2e83-186a-4a0f-ab27-bee8a8096abc"/>
+    <ds:schemaRef ds:uri="http://schemas.microsoft.com/office/2006/documentManagement/types"/>
+    <ds:schemaRef ds:uri="http://schemas.microsoft.com/office/infopath/2007/PartnerControls"/>
+    <ds:schemaRef ds:uri="http://purl.org/dc/elements/1.1/"/>
+    <ds:schemaRef ds:uri="http://www.w3.org/XML/1998/namespace"/>
+    <ds:schemaRef ds:uri="http://purl.org/dc/dcmitype/"/>
+  </ds:schemaRefs>
+</ds:datastoreItem>
 </file>
</xml_diff>